<commit_message>
Kleine Korrekturen in Präsi
</commit_message>
<xml_diff>
--- a/presi/presi.pptx
+++ b/presi/presi.pptx
@@ -11438,7 +11438,6 @@
               <a:rPr lang="de-CH" dirty="0" smtClean="0"/>
               <a:t>Go</a:t>
             </a:r>
-            <a:endParaRPr lang="de-CH" dirty="0" smtClean="0"/>
           </a:p>
           <a:p>
             <a:r>
@@ -11450,13 +11449,8 @@
             <a:pPr lvl="1"/>
             <a:r>
               <a:rPr lang="de-CH" dirty="0" smtClean="0"/>
-              <a:t>Nicht klassenbasiertes </a:t>
-            </a:r>
-            <a:r>
-              <a:rPr lang="de-CH" dirty="0" smtClean="0"/>
-              <a:t>OOP</a:t>
-            </a:r>
-            <a:endParaRPr lang="de-CH" dirty="0" smtClean="0"/>
+              <a:t>Nicht klassenbasiertes OOP</a:t>
+            </a:r>
           </a:p>
           <a:p>
             <a:pPr lvl="1"/>
@@ -11464,7 +11458,6 @@
               <a:rPr lang="de-CH" dirty="0" smtClean="0"/>
               <a:t>Slice</a:t>
             </a:r>
-            <a:endParaRPr lang="de-CH" dirty="0" smtClean="0"/>
           </a:p>
           <a:p>
             <a:pPr lvl="1"/>
@@ -11558,27 +11551,7 @@
             </a:r>
             <a:r>
               <a:rPr lang="en-US" dirty="0" smtClean="0"/>
-              <a:t> 2009</a:t>
-            </a:r>
-            <a:r>
-              <a:rPr lang="en-US" dirty="0" smtClean="0"/>
-              <a:t>, </a:t>
-            </a:r>
-            <a:r>
-              <a:rPr lang="en-US" dirty="0" smtClean="0"/>
-              <a:t>first </a:t>
-            </a:r>
-            <a:r>
-              <a:rPr lang="en-US" dirty="0" smtClean="0"/>
-              <a:t>official </a:t>
-            </a:r>
-            <a:r>
-              <a:rPr lang="en-US" dirty="0" smtClean="0"/>
-              <a:t>release </a:t>
-            </a:r>
-            <a:r>
-              <a:rPr lang="en-US" dirty="0" smtClean="0"/>
-              <a:t>2012</a:t>
+              <a:t> 2009, first official release 2012</a:t>
             </a:r>
           </a:p>
           <a:p>
@@ -11669,15 +11642,7 @@
             </a:r>
             <a:r>
               <a:rPr lang="en-US" dirty="0" smtClean="0"/>
-              <a:t>nterface-Tools </a:t>
-            </a:r>
-            <a:r>
-              <a:rPr lang="en-US" dirty="0" smtClean="0"/>
-              <a:t>(Docker</a:t>
-            </a:r>
-            <a:r>
-              <a:rPr lang="en-US" dirty="0" smtClean="0"/>
-              <a:t>)</a:t>
+              <a:t>nterface-Tools (Docker)</a:t>
             </a:r>
             <a:endParaRPr lang="en-US" dirty="0"/>
           </a:p>
@@ -11790,7 +11755,11 @@
           <a:p>
             <a:r>
               <a:rPr lang="de-CH" dirty="0" smtClean="0"/>
-              <a:t>Statisch typisiert</a:t>
+              <a:t>Statisch </a:t>
+            </a:r>
+            <a:r>
+              <a:rPr lang="de-CH" dirty="0" smtClean="0"/>
+              <a:t>typisiert</a:t>
             </a:r>
             <a:endParaRPr lang="de-CH" dirty="0"/>
           </a:p>
@@ -11799,38 +11768,45 @@
               <a:rPr lang="de-CH" dirty="0" smtClean="0"/>
               <a:t>Imperativ (objektorientierte Programmierung möglich – ohne Klassen)</a:t>
             </a:r>
+          </a:p>
+          <a:p>
+            <a:r>
+              <a:rPr lang="de-CH" dirty="0" smtClean="0"/>
+              <a:t>Go-Programme </a:t>
+            </a:r>
+            <a:r>
+              <a:rPr lang="de-CH" dirty="0" smtClean="0"/>
+              <a:t>werden für das jeweilige Zielsystem zu einer ausführbaren Datei </a:t>
+            </a:r>
+            <a:r>
+              <a:rPr lang="de-CH" dirty="0" smtClean="0"/>
+              <a:t>kompiliert (Cross-</a:t>
+            </a:r>
+            <a:r>
+              <a:rPr lang="de-CH" dirty="0" err="1" smtClean="0"/>
+              <a:t>Compiling</a:t>
+            </a:r>
+            <a:r>
+              <a:rPr lang="de-CH" dirty="0" smtClean="0"/>
+              <a:t> möglich).</a:t>
+            </a:r>
             <a:endParaRPr lang="de-CH" dirty="0" smtClean="0"/>
           </a:p>
           <a:p>
             <a:r>
               <a:rPr lang="de-CH" dirty="0" smtClean="0"/>
-              <a:t>Go-Programme </a:t>
-            </a:r>
-            <a:r>
-              <a:rPr lang="de-CH" dirty="0" smtClean="0"/>
-              <a:t>werden für das jeweilige Zielsystem zu einer ausführbaren Datei </a:t>
-            </a:r>
-            <a:r>
-              <a:rPr lang="de-CH" dirty="0" smtClean="0"/>
-              <a:t>kompiliert.</a:t>
-            </a:r>
-            <a:endParaRPr lang="de-CH" dirty="0" smtClean="0"/>
-          </a:p>
-          <a:p>
-            <a:r>
-              <a:rPr lang="de-CH" dirty="0" smtClean="0"/>
-              <a:t>Syntax ähnlich wie C</a:t>
+              <a:t>Syntax </a:t>
+            </a:r>
+            <a:r>
+              <a:rPr lang="de-CH" dirty="0" smtClean="0"/>
+              <a:t>ähnlich wie C</a:t>
             </a:r>
             <a:endParaRPr lang="de-CH" dirty="0"/>
           </a:p>
           <a:p>
             <a:r>
               <a:rPr lang="de-CH" dirty="0" smtClean="0"/>
-              <a:t>Datenstrukturen: Arrays</a:t>
-            </a:r>
-            <a:r>
-              <a:rPr lang="de-CH" dirty="0" smtClean="0"/>
-              <a:t>, Slice, </a:t>
+              <a:t>Datenstrukturen: Arrays, Slice, </a:t>
             </a:r>
             <a:r>
               <a:rPr lang="de-CH" dirty="0" err="1" smtClean="0"/>
@@ -11956,15 +11932,7 @@
           <a:p>
             <a:r>
               <a:rPr lang="de-CH" dirty="0" smtClean="0"/>
-              <a:t>Interface wird </a:t>
-            </a:r>
-            <a:r>
-              <a:rPr lang="de-CH" dirty="0" smtClean="0"/>
-              <a:t>erfüllt, </a:t>
-            </a:r>
-            <a:r>
-              <a:rPr lang="de-CH" dirty="0" smtClean="0"/>
-              <a:t>wenn </a:t>
+              <a:t>Interface wird erfüllt, wenn </a:t>
             </a:r>
             <a:r>
               <a:rPr lang="de-CH" dirty="0" err="1" smtClean="0"/>

</xml_diff>